<commit_message>
Fixed typo i n skipconnection 3x3 -> 1x1 conv
</commit_message>
<xml_diff>
--- a/images/presentation/models.pptx
+++ b/images/presentation/models.pptx
@@ -256,7 +256,7 @@
           <a:p>
             <a:fld id="{8CFA0E7C-984D-478C-8A58-5F25078EE913}" type="datetimeFigureOut">
               <a:rPr lang="en-US" smtClean="0"/>
-              <a:t>18-Sep-22</a:t>
+              <a:t>03-Feb-23</a:t>
             </a:fld>
             <a:endParaRPr lang="en-US"/>
           </a:p>
@@ -426,7 +426,7 @@
           <a:p>
             <a:fld id="{8CFA0E7C-984D-478C-8A58-5F25078EE913}" type="datetimeFigureOut">
               <a:rPr lang="en-US" smtClean="0"/>
-              <a:t>18-Sep-22</a:t>
+              <a:t>03-Feb-23</a:t>
             </a:fld>
             <a:endParaRPr lang="en-US"/>
           </a:p>
@@ -606,7 +606,7 @@
           <a:p>
             <a:fld id="{8CFA0E7C-984D-478C-8A58-5F25078EE913}" type="datetimeFigureOut">
               <a:rPr lang="en-US" smtClean="0"/>
-              <a:t>18-Sep-22</a:t>
+              <a:t>03-Feb-23</a:t>
             </a:fld>
             <a:endParaRPr lang="en-US"/>
           </a:p>
@@ -805,7 +805,7 @@
                 </a:solidFill>
               </a:rPr>
               <a:pPr/>
-              <a:t>18-Sep-22</a:t>
+              <a:t>03-Feb-23</a:t>
             </a:fld>
             <a:endParaRPr lang="en-US">
               <a:solidFill>
@@ -1007,7 +1007,7 @@
                 </a:solidFill>
               </a:rPr>
               <a:pPr/>
-              <a:t>18-Sep-22</a:t>
+              <a:t>03-Feb-23</a:t>
             </a:fld>
             <a:endParaRPr lang="en-US">
               <a:solidFill>
@@ -1285,7 +1285,7 @@
                 </a:solidFill>
               </a:rPr>
               <a:pPr/>
-              <a:t>18-Sep-22</a:t>
+              <a:t>03-Feb-23</a:t>
             </a:fld>
             <a:endParaRPr lang="en-US">
               <a:solidFill>
@@ -1549,7 +1549,7 @@
                 </a:solidFill>
               </a:rPr>
               <a:pPr/>
-              <a:t>18-Sep-22</a:t>
+              <a:t>03-Feb-23</a:t>
             </a:fld>
             <a:endParaRPr lang="en-US">
               <a:solidFill>
@@ -1948,7 +1948,7 @@
                 </a:solidFill>
               </a:rPr>
               <a:pPr/>
-              <a:t>18-Sep-22</a:t>
+              <a:t>03-Feb-23</a:t>
             </a:fld>
             <a:endParaRPr lang="en-US">
               <a:solidFill>
@@ -2098,7 +2098,7 @@
                 </a:solidFill>
               </a:rPr>
               <a:pPr/>
-              <a:t>18-Sep-22</a:t>
+              <a:t>03-Feb-23</a:t>
             </a:fld>
             <a:endParaRPr lang="en-US">
               <a:solidFill>
@@ -2225,7 +2225,7 @@
                 </a:solidFill>
               </a:rPr>
               <a:pPr/>
-              <a:t>18-Sep-22</a:t>
+              <a:t>03-Feb-23</a:t>
             </a:fld>
             <a:endParaRPr lang="en-US">
               <a:solidFill>
@@ -2534,7 +2534,7 @@
                 </a:solidFill>
               </a:rPr>
               <a:pPr/>
-              <a:t>18-Sep-22</a:t>
+              <a:t>03-Feb-23</a:t>
             </a:fld>
             <a:endParaRPr lang="en-US">
               <a:solidFill>
@@ -2729,7 +2729,7 @@
           <a:p>
             <a:fld id="{8CFA0E7C-984D-478C-8A58-5F25078EE913}" type="datetimeFigureOut">
               <a:rPr lang="en-US" smtClean="0"/>
-              <a:t>18-Sep-22</a:t>
+              <a:t>03-Feb-23</a:t>
             </a:fld>
             <a:endParaRPr lang="en-US"/>
           </a:p>
@@ -2989,7 +2989,7 @@
                 </a:solidFill>
               </a:rPr>
               <a:pPr/>
-              <a:t>18-Sep-22</a:t>
+              <a:t>03-Feb-23</a:t>
             </a:fld>
             <a:endParaRPr lang="en-US">
               <a:solidFill>
@@ -3191,7 +3191,7 @@
                 </a:solidFill>
               </a:rPr>
               <a:pPr/>
-              <a:t>18-Sep-22</a:t>
+              <a:t>03-Feb-23</a:t>
             </a:fld>
             <a:endParaRPr lang="en-US">
               <a:solidFill>
@@ -3403,7 +3403,7 @@
                 </a:solidFill>
               </a:rPr>
               <a:pPr/>
-              <a:t>18-Sep-22</a:t>
+              <a:t>03-Feb-23</a:t>
             </a:fld>
             <a:endParaRPr lang="en-US">
               <a:solidFill>
@@ -3672,7 +3672,7 @@
           <a:p>
             <a:fld id="{8CFA0E7C-984D-478C-8A58-5F25078EE913}" type="datetimeFigureOut">
               <a:rPr lang="en-US" smtClean="0"/>
-              <a:t>18-Sep-22</a:t>
+              <a:t>03-Feb-23</a:t>
             </a:fld>
             <a:endParaRPr lang="en-US"/>
           </a:p>
@@ -3904,7 +3904,7 @@
           <a:p>
             <a:fld id="{8CFA0E7C-984D-478C-8A58-5F25078EE913}" type="datetimeFigureOut">
               <a:rPr lang="en-US" smtClean="0"/>
-              <a:t>18-Sep-22</a:t>
+              <a:t>03-Feb-23</a:t>
             </a:fld>
             <a:endParaRPr lang="en-US"/>
           </a:p>
@@ -4271,7 +4271,7 @@
           <a:p>
             <a:fld id="{8CFA0E7C-984D-478C-8A58-5F25078EE913}" type="datetimeFigureOut">
               <a:rPr lang="en-US" smtClean="0"/>
-              <a:t>18-Sep-22</a:t>
+              <a:t>03-Feb-23</a:t>
             </a:fld>
             <a:endParaRPr lang="en-US"/>
           </a:p>
@@ -4389,7 +4389,7 @@
           <a:p>
             <a:fld id="{8CFA0E7C-984D-478C-8A58-5F25078EE913}" type="datetimeFigureOut">
               <a:rPr lang="en-US" smtClean="0"/>
-              <a:t>18-Sep-22</a:t>
+              <a:t>03-Feb-23</a:t>
             </a:fld>
             <a:endParaRPr lang="en-US"/>
           </a:p>
@@ -4484,7 +4484,7 @@
           <a:p>
             <a:fld id="{8CFA0E7C-984D-478C-8A58-5F25078EE913}" type="datetimeFigureOut">
               <a:rPr lang="en-US" smtClean="0"/>
-              <a:t>18-Sep-22</a:t>
+              <a:t>03-Feb-23</a:t>
             </a:fld>
             <a:endParaRPr lang="en-US"/>
           </a:p>
@@ -4761,7 +4761,7 @@
           <a:p>
             <a:fld id="{8CFA0E7C-984D-478C-8A58-5F25078EE913}" type="datetimeFigureOut">
               <a:rPr lang="en-US" smtClean="0"/>
-              <a:t>18-Sep-22</a:t>
+              <a:t>03-Feb-23</a:t>
             </a:fld>
             <a:endParaRPr lang="en-US"/>
           </a:p>
@@ -5018,7 +5018,7 @@
           <a:p>
             <a:fld id="{8CFA0E7C-984D-478C-8A58-5F25078EE913}" type="datetimeFigureOut">
               <a:rPr lang="en-US" smtClean="0"/>
-              <a:t>18-Sep-22</a:t>
+              <a:t>03-Feb-23</a:t>
             </a:fld>
             <a:endParaRPr lang="en-US"/>
           </a:p>
@@ -5231,7 +5231,7 @@
           <a:p>
             <a:fld id="{8CFA0E7C-984D-478C-8A58-5F25078EE913}" type="datetimeFigureOut">
               <a:rPr lang="en-US" smtClean="0"/>
-              <a:t>18-Sep-22</a:t>
+              <a:t>03-Feb-23</a:t>
             </a:fld>
             <a:endParaRPr lang="en-US"/>
           </a:p>
@@ -5778,7 +5778,7 @@
                 </a:solidFill>
               </a:rPr>
               <a:pPr/>
-              <a:t>18-Sep-22</a:t>
+              <a:t>03-Feb-23</a:t>
             </a:fld>
             <a:endParaRPr lang="en-US">
               <a:solidFill>
@@ -6354,10 +6354,17 @@
             <a:avLst/>
           </a:prstGeom>
           <a:solidFill>
-            <a:srgbClr val="FF5050"/>
+            <a:schemeClr val="accent4">
+              <a:lumMod val="20000"/>
+              <a:lumOff val="80000"/>
+            </a:schemeClr>
           </a:solidFill>
           <a:ln>
-            <a:noFill/>
+            <a:solidFill>
+              <a:schemeClr val="bg1">
+                <a:lumMod val="75000"/>
+              </a:schemeClr>
+            </a:solidFill>
           </a:ln>
         </p:spPr>
         <p:style>
@@ -6387,33 +6394,36 @@
           <a:p>
             <a:pPr algn="ctr"/>
             <a:r>
-              <a:rPr lang="en-US" sz="800" b="1" dirty="0" smtClean="0">
+              <a:rPr lang="en-US" sz="800" b="1" dirty="0">
                 <a:solidFill>
-                  <a:schemeClr val="bg1"/>
+                  <a:schemeClr val="accent1">
+                    <a:lumMod val="50000"/>
+                  </a:schemeClr>
                 </a:solidFill>
                 <a:latin typeface="Tahoma" panose="020B0604030504040204" pitchFamily="34" charset="0"/>
                 <a:ea typeface="Tahoma" panose="020B0604030504040204" pitchFamily="34" charset="0"/>
                 <a:cs typeface="Tahoma" panose="020B0604030504040204" pitchFamily="34" charset="0"/>
               </a:rPr>
-              <a:t>ASPP conv</a:t>
+              <a:t>Conv2d(2048, 256, </a:t>
             </a:r>
-          </a:p>
-          <a:p>
-            <a:pPr algn="ctr"/>
             <a:r>
               <a:rPr lang="en-US" sz="800" b="1" dirty="0" smtClean="0">
                 <a:solidFill>
-                  <a:schemeClr val="bg1"/>
+                  <a:schemeClr val="accent1">
+                    <a:lumMod val="50000"/>
+                  </a:schemeClr>
                 </a:solidFill>
                 <a:latin typeface="Tahoma" panose="020B0604030504040204" pitchFamily="34" charset="0"/>
                 <a:ea typeface="Tahoma" panose="020B0604030504040204" pitchFamily="34" charset="0"/>
                 <a:cs typeface="Tahoma" panose="020B0604030504040204" pitchFamily="34" charset="0"/>
               </a:rPr>
-              <a:t>(2048, 256,rate =6)</a:t>
+              <a:t>1)</a:t>
             </a:r>
             <a:endParaRPr lang="en-US" sz="800" b="1" dirty="0">
               <a:solidFill>
-                <a:schemeClr val="bg1"/>
+                <a:schemeClr val="accent1">
+                  <a:lumMod val="50000"/>
+                </a:schemeClr>
               </a:solidFill>
               <a:latin typeface="Tahoma" panose="020B0604030504040204" pitchFamily="34" charset="0"/>
               <a:ea typeface="Tahoma" panose="020B0604030504040204" pitchFamily="34" charset="0"/>
@@ -6437,7 +6447,9 @@
             <a:avLst/>
           </a:prstGeom>
           <a:solidFill>
-            <a:schemeClr val="accent2"/>
+            <a:schemeClr val="accent1">
+              <a:lumMod val="50000"/>
+            </a:schemeClr>
           </a:solidFill>
           <a:ln>
             <a:noFill/>
@@ -6503,7 +6515,7 @@
                 <a:ea typeface="Tahoma" panose="020B0604030504040204" pitchFamily="34" charset="0"/>
                 <a:cs typeface="Tahoma" panose="020B0604030504040204" pitchFamily="34" charset="0"/>
               </a:rPr>
-              <a:t>=12)</a:t>
+              <a:t>=6)</a:t>
             </a:r>
             <a:endParaRPr lang="en-US" sz="800" b="1" dirty="0">
               <a:solidFill>
@@ -7258,7 +7270,9 @@
             <a:avLst/>
           </a:prstGeom>
           <a:solidFill>
-            <a:srgbClr val="00B0F0"/>
+            <a:schemeClr val="accent1">
+              <a:lumMod val="50000"/>
+            </a:schemeClr>
           </a:solidFill>
           <a:ln>
             <a:noFill/>
@@ -7597,17 +7611,12 @@
             <a:avLst/>
           </a:prstGeom>
           <a:solidFill>
-            <a:schemeClr val="accent4">
-              <a:lumMod val="20000"/>
-              <a:lumOff val="80000"/>
+            <a:schemeClr val="accent1">
+              <a:lumMod val="50000"/>
             </a:schemeClr>
           </a:solidFill>
           <a:ln>
-            <a:solidFill>
-              <a:schemeClr val="bg1">
-                <a:lumMod val="75000"/>
-              </a:schemeClr>
-            </a:solidFill>
+            <a:noFill/>
           </a:ln>
         </p:spPr>
         <p:style>
@@ -7637,23 +7646,44 @@
           <a:p>
             <a:pPr algn="ctr"/>
             <a:r>
-              <a:rPr lang="en-US" sz="800" b="1" dirty="0" smtClean="0">
+              <a:rPr lang="en-US" sz="800" b="1" dirty="0">
                 <a:solidFill>
-                  <a:schemeClr val="accent1">
-                    <a:lumMod val="50000"/>
-                  </a:schemeClr>
+                  <a:schemeClr val="bg1"/>
                 </a:solidFill>
                 <a:latin typeface="Tahoma" panose="020B0604030504040204" pitchFamily="34" charset="0"/>
                 <a:ea typeface="Tahoma" panose="020B0604030504040204" pitchFamily="34" charset="0"/>
                 <a:cs typeface="Tahoma" panose="020B0604030504040204" pitchFamily="34" charset="0"/>
               </a:rPr>
-              <a:t>Conv2d(2048, 256, 3)</a:t>
+              <a:t>ASPP conv</a:t>
+            </a:r>
+          </a:p>
+          <a:p>
+            <a:pPr algn="ctr"/>
+            <a:r>
+              <a:rPr lang="en-US" sz="800" b="1" dirty="0">
+                <a:solidFill>
+                  <a:schemeClr val="bg1"/>
+                </a:solidFill>
+                <a:latin typeface="Tahoma" panose="020B0604030504040204" pitchFamily="34" charset="0"/>
+                <a:ea typeface="Tahoma" panose="020B0604030504040204" pitchFamily="34" charset="0"/>
+                <a:cs typeface="Tahoma" panose="020B0604030504040204" pitchFamily="34" charset="0"/>
+              </a:rPr>
+              <a:t>(2048, 256,rate </a:t>
+            </a:r>
+            <a:r>
+              <a:rPr lang="en-US" sz="800" b="1" dirty="0" smtClean="0">
+                <a:solidFill>
+                  <a:schemeClr val="bg1"/>
+                </a:solidFill>
+                <a:latin typeface="Tahoma" panose="020B0604030504040204" pitchFamily="34" charset="0"/>
+                <a:ea typeface="Tahoma" panose="020B0604030504040204" pitchFamily="34" charset="0"/>
+                <a:cs typeface="Tahoma" panose="020B0604030504040204" pitchFamily="34" charset="0"/>
+              </a:rPr>
+              <a:t>=12)</a:t>
             </a:r>
             <a:endParaRPr lang="en-US" sz="800" b="1" dirty="0">
               <a:solidFill>
-                <a:schemeClr val="accent1">
-                  <a:lumMod val="50000"/>
-                </a:schemeClr>
+                <a:schemeClr val="bg1"/>
               </a:solidFill>
               <a:latin typeface="Tahoma" panose="020B0604030504040204" pitchFamily="34" charset="0"/>
               <a:ea typeface="Tahoma" panose="020B0604030504040204" pitchFamily="34" charset="0"/>

</xml_diff>